<commit_message>
edits to manager's report
</commit_message>
<xml_diff>
--- a/outputs/forpub/extras/study_area.pptx
+++ b/outputs/forpub/extras/study_area.pptx
@@ -6,6 +6,7 @@
   </p:sldMasterIdLst>
   <p:sldIdLst>
     <p:sldId id="256" r:id="rId2"/>
+    <p:sldId id="257" r:id="rId3"/>
   </p:sldIdLst>
   <p:sldSz cx="12192000" cy="6858000"/>
   <p:notesSz cx="6858000" cy="9144000"/>
@@ -259,7 +260,7 @@
           <a:p>
             <a:fld id="{79CA2621-9C9E-8341-B92B-7B23C30F706B}" type="datetimeFigureOut">
               <a:rPr lang="en-US" smtClean="0"/>
-              <a:t>3/31/23</a:t>
+              <a:t>4/21/23</a:t>
             </a:fld>
             <a:endParaRPr lang="en-US"/>
           </a:p>
@@ -457,7 +458,7 @@
           <a:p>
             <a:fld id="{79CA2621-9C9E-8341-B92B-7B23C30F706B}" type="datetimeFigureOut">
               <a:rPr lang="en-US" smtClean="0"/>
-              <a:t>3/31/23</a:t>
+              <a:t>4/21/23</a:t>
             </a:fld>
             <a:endParaRPr lang="en-US"/>
           </a:p>
@@ -665,7 +666,7 @@
           <a:p>
             <a:fld id="{79CA2621-9C9E-8341-B92B-7B23C30F706B}" type="datetimeFigureOut">
               <a:rPr lang="en-US" smtClean="0"/>
-              <a:t>3/31/23</a:t>
+              <a:t>4/21/23</a:t>
             </a:fld>
             <a:endParaRPr lang="en-US"/>
           </a:p>
@@ -863,7 +864,7 @@
           <a:p>
             <a:fld id="{79CA2621-9C9E-8341-B92B-7B23C30F706B}" type="datetimeFigureOut">
               <a:rPr lang="en-US" smtClean="0"/>
-              <a:t>3/31/23</a:t>
+              <a:t>4/21/23</a:t>
             </a:fld>
             <a:endParaRPr lang="en-US"/>
           </a:p>
@@ -1138,7 +1139,7 @@
           <a:p>
             <a:fld id="{79CA2621-9C9E-8341-B92B-7B23C30F706B}" type="datetimeFigureOut">
               <a:rPr lang="en-US" smtClean="0"/>
-              <a:t>3/31/23</a:t>
+              <a:t>4/21/23</a:t>
             </a:fld>
             <a:endParaRPr lang="en-US"/>
           </a:p>
@@ -1403,7 +1404,7 @@
           <a:p>
             <a:fld id="{79CA2621-9C9E-8341-B92B-7B23C30F706B}" type="datetimeFigureOut">
               <a:rPr lang="en-US" smtClean="0"/>
-              <a:t>3/31/23</a:t>
+              <a:t>4/21/23</a:t>
             </a:fld>
             <a:endParaRPr lang="en-US"/>
           </a:p>
@@ -1815,7 +1816,7 @@
           <a:p>
             <a:fld id="{79CA2621-9C9E-8341-B92B-7B23C30F706B}" type="datetimeFigureOut">
               <a:rPr lang="en-US" smtClean="0"/>
-              <a:t>3/31/23</a:t>
+              <a:t>4/21/23</a:t>
             </a:fld>
             <a:endParaRPr lang="en-US"/>
           </a:p>
@@ -1956,7 +1957,7 @@
           <a:p>
             <a:fld id="{79CA2621-9C9E-8341-B92B-7B23C30F706B}" type="datetimeFigureOut">
               <a:rPr lang="en-US" smtClean="0"/>
-              <a:t>3/31/23</a:t>
+              <a:t>4/21/23</a:t>
             </a:fld>
             <a:endParaRPr lang="en-US"/>
           </a:p>
@@ -2069,7 +2070,7 @@
           <a:p>
             <a:fld id="{79CA2621-9C9E-8341-B92B-7B23C30F706B}" type="datetimeFigureOut">
               <a:rPr lang="en-US" smtClean="0"/>
-              <a:t>3/31/23</a:t>
+              <a:t>4/21/23</a:t>
             </a:fld>
             <a:endParaRPr lang="en-US"/>
           </a:p>
@@ -2380,7 +2381,7 @@
           <a:p>
             <a:fld id="{79CA2621-9C9E-8341-B92B-7B23C30F706B}" type="datetimeFigureOut">
               <a:rPr lang="en-US" smtClean="0"/>
-              <a:t>3/31/23</a:t>
+              <a:t>4/21/23</a:t>
             </a:fld>
             <a:endParaRPr lang="en-US"/>
           </a:p>
@@ -2668,7 +2669,7 @@
           <a:p>
             <a:fld id="{79CA2621-9C9E-8341-B92B-7B23C30F706B}" type="datetimeFigureOut">
               <a:rPr lang="en-US" smtClean="0"/>
-              <a:t>3/31/23</a:t>
+              <a:t>4/21/23</a:t>
             </a:fld>
             <a:endParaRPr lang="en-US"/>
           </a:p>
@@ -2909,7 +2910,7 @@
           <a:p>
             <a:fld id="{79CA2621-9C9E-8341-B92B-7B23C30F706B}" type="datetimeFigureOut">
               <a:rPr lang="en-US" smtClean="0"/>
-              <a:t>3/31/23</a:t>
+              <a:t>4/21/23</a:t>
             </a:fld>
             <a:endParaRPr lang="en-US"/>
           </a:p>
@@ -3516,6 +3517,218 @@
 </p:sld>
 </file>
 
+<file path=ppt/slides/slide2.xml><?xml version="1.0" encoding="utf-8"?>
+<p:sld xmlns:a="http://schemas.openxmlformats.org/drawingml/2006/main" xmlns:r="http://schemas.openxmlformats.org/officeDocument/2006/relationships" xmlns:p="http://schemas.openxmlformats.org/presentationml/2006/main">
+  <p:cSld>
+    <p:spTree>
+      <p:nvGrpSpPr>
+        <p:cNvPr id="1" name=""/>
+        <p:cNvGrpSpPr/>
+        <p:nvPr/>
+      </p:nvGrpSpPr>
+      <p:grpSpPr>
+        <a:xfrm>
+          <a:off x="0" y="0"/>
+          <a:ext cx="0" cy="0"/>
+          <a:chOff x="0" y="0"/>
+          <a:chExt cx="0" cy="0"/>
+        </a:xfrm>
+      </p:grpSpPr>
+      <p:pic>
+        <p:nvPicPr>
+          <p:cNvPr id="4" name="Picture 3">
+            <a:extLst>
+              <a:ext uri="{FF2B5EF4-FFF2-40B4-BE49-F238E27FC236}">
+                <a16:creationId xmlns:a16="http://schemas.microsoft.com/office/drawing/2014/main" id="{A46DEC06-5BF2-8F0C-AA51-5A78D1E845E0}"/>
+              </a:ext>
+            </a:extLst>
+          </p:cNvPr>
+          <p:cNvPicPr>
+            <a:picLocks noChangeAspect="1"/>
+          </p:cNvPicPr>
+          <p:nvPr/>
+        </p:nvPicPr>
+        <p:blipFill>
+          <a:blip r:embed="rId2"/>
+          <a:srcRect/>
+          <a:stretch/>
+        </p:blipFill>
+        <p:spPr>
+          <a:xfrm>
+            <a:off x="1524001" y="0"/>
+            <a:ext cx="9702799" cy="6791958"/>
+          </a:xfrm>
+          <a:prstGeom prst="rect">
+            <a:avLst/>
+          </a:prstGeom>
+          <a:ln w="12700">
+            <a:solidFill>
+              <a:schemeClr val="tx1"/>
+            </a:solidFill>
+          </a:ln>
+        </p:spPr>
+      </p:pic>
+      <p:sp>
+        <p:nvSpPr>
+          <p:cNvPr id="5" name="Rectangle 4">
+            <a:extLst>
+              <a:ext uri="{FF2B5EF4-FFF2-40B4-BE49-F238E27FC236}">
+                <a16:creationId xmlns:a16="http://schemas.microsoft.com/office/drawing/2014/main" id="{B17C517E-9D9B-2AE8-A4BF-182BBF7423D5}"/>
+              </a:ext>
+            </a:extLst>
+          </p:cNvPr>
+          <p:cNvSpPr/>
+          <p:nvPr/>
+        </p:nvSpPr>
+        <p:spPr>
+          <a:xfrm>
+            <a:off x="1524001" y="0"/>
+            <a:ext cx="2510971" cy="2481943"/>
+          </a:xfrm>
+          <a:prstGeom prst="rect">
+            <a:avLst/>
+          </a:prstGeom>
+          <a:solidFill>
+            <a:schemeClr val="bg1"/>
+          </a:solidFill>
+          <a:ln>
+            <a:solidFill>
+              <a:schemeClr val="tx1"/>
+            </a:solidFill>
+          </a:ln>
+          <a:effectLst>
+            <a:outerShdw blurRad="50800" dist="38100" dir="2700000" algn="tl" rotWithShape="0">
+              <a:prstClr val="black">
+                <a:alpha val="40000"/>
+              </a:prstClr>
+            </a:outerShdw>
+          </a:effectLst>
+        </p:spPr>
+        <p:style>
+          <a:lnRef idx="2">
+            <a:schemeClr val="accent1">
+              <a:shade val="50000"/>
+            </a:schemeClr>
+          </a:lnRef>
+          <a:fillRef idx="1">
+            <a:schemeClr val="accent1"/>
+          </a:fillRef>
+          <a:effectRef idx="0">
+            <a:schemeClr val="accent1"/>
+          </a:effectRef>
+          <a:fontRef idx="minor">
+            <a:schemeClr val="lt1"/>
+          </a:fontRef>
+        </p:style>
+        <p:txBody>
+          <a:bodyPr rtlCol="0" anchor="ctr"/>
+          <a:lstStyle/>
+          <a:p>
+            <a:pPr algn="ctr"/>
+            <a:endParaRPr lang="en-US"/>
+          </a:p>
+        </p:txBody>
+      </p:sp>
+      <p:pic>
+        <p:nvPicPr>
+          <p:cNvPr id="6" name="Picture 5" descr="Map&#10;&#10;Description automatically generated">
+            <a:extLst>
+              <a:ext uri="{FF2B5EF4-FFF2-40B4-BE49-F238E27FC236}">
+                <a16:creationId xmlns:a16="http://schemas.microsoft.com/office/drawing/2014/main" id="{74C739F2-439D-2CE4-A9C4-E49DA8D690B6}"/>
+              </a:ext>
+            </a:extLst>
+          </p:cNvPr>
+          <p:cNvPicPr>
+            <a:picLocks noChangeAspect="1"/>
+          </p:cNvPicPr>
+          <p:nvPr/>
+        </p:nvPicPr>
+        <p:blipFill rotWithShape="1">
+          <a:blip r:embed="rId3"/>
+          <a:srcRect l="30858" t="6264" r="4177" b="27262"/>
+          <a:stretch/>
+        </p:blipFill>
+        <p:spPr>
+          <a:xfrm>
+            <a:off x="1524001" y="0"/>
+            <a:ext cx="2418443" cy="2474585"/>
+          </a:xfrm>
+          <a:prstGeom prst="rect">
+            <a:avLst/>
+          </a:prstGeom>
+        </p:spPr>
+      </p:pic>
+      <p:sp>
+        <p:nvSpPr>
+          <p:cNvPr id="7" name="Frame 6">
+            <a:extLst>
+              <a:ext uri="{FF2B5EF4-FFF2-40B4-BE49-F238E27FC236}">
+                <a16:creationId xmlns:a16="http://schemas.microsoft.com/office/drawing/2014/main" id="{689D1629-59A7-87F2-8D55-9A77D9D9A001}"/>
+              </a:ext>
+            </a:extLst>
+          </p:cNvPr>
+          <p:cNvSpPr/>
+          <p:nvPr/>
+        </p:nvSpPr>
+        <p:spPr>
+          <a:xfrm>
+            <a:off x="3178630" y="1048605"/>
+            <a:ext cx="304800" cy="228651"/>
+          </a:xfrm>
+          <a:prstGeom prst="frame">
+            <a:avLst/>
+          </a:prstGeom>
+          <a:solidFill>
+            <a:schemeClr val="tx1"/>
+          </a:solidFill>
+          <a:ln>
+            <a:solidFill>
+              <a:schemeClr val="tx1"/>
+            </a:solidFill>
+          </a:ln>
+        </p:spPr>
+        <p:style>
+          <a:lnRef idx="2">
+            <a:schemeClr val="accent1">
+              <a:shade val="50000"/>
+            </a:schemeClr>
+          </a:lnRef>
+          <a:fillRef idx="1">
+            <a:schemeClr val="accent1"/>
+          </a:fillRef>
+          <a:effectRef idx="0">
+            <a:schemeClr val="accent1"/>
+          </a:effectRef>
+          <a:fontRef idx="minor">
+            <a:schemeClr val="lt1"/>
+          </a:fontRef>
+        </p:style>
+        <p:txBody>
+          <a:bodyPr rtlCol="0" anchor="ctr"/>
+          <a:lstStyle/>
+          <a:p>
+            <a:pPr algn="ctr"/>
+            <a:endParaRPr lang="en-US">
+              <a:solidFill>
+                <a:schemeClr val="tx1"/>
+              </a:solidFill>
+            </a:endParaRPr>
+          </a:p>
+        </p:txBody>
+      </p:sp>
+    </p:spTree>
+    <p:extLst>
+      <p:ext uri="{BB962C8B-B14F-4D97-AF65-F5344CB8AC3E}">
+        <p14:creationId xmlns:p14="http://schemas.microsoft.com/office/powerpoint/2010/main" val="1223832833"/>
+      </p:ext>
+    </p:extLst>
+  </p:cSld>
+  <p:clrMapOvr>
+    <a:masterClrMapping/>
+  </p:clrMapOvr>
+</p:sld>
+</file>
+
 <file path=ppt/theme/theme1.xml><?xml version="1.0" encoding="utf-8"?>
 <a:theme xmlns:a="http://schemas.openxmlformats.org/drawingml/2006/main" name="Office Theme">
   <a:themeElements>

</xml_diff>

<commit_message>
new figure for ms
</commit_message>
<xml_diff>
--- a/outputs/forpub/extras/study_area.pptx
+++ b/outputs/forpub/extras/study_area.pptx
@@ -260,7 +260,7 @@
           <a:p>
             <a:fld id="{79CA2621-9C9E-8341-B92B-7B23C30F706B}" type="datetimeFigureOut">
               <a:rPr lang="en-US" smtClean="0"/>
-              <a:t>4/21/23</a:t>
+              <a:t>6/30/23</a:t>
             </a:fld>
             <a:endParaRPr lang="en-US"/>
           </a:p>
@@ -458,7 +458,7 @@
           <a:p>
             <a:fld id="{79CA2621-9C9E-8341-B92B-7B23C30F706B}" type="datetimeFigureOut">
               <a:rPr lang="en-US" smtClean="0"/>
-              <a:t>4/21/23</a:t>
+              <a:t>6/30/23</a:t>
             </a:fld>
             <a:endParaRPr lang="en-US"/>
           </a:p>
@@ -666,7 +666,7 @@
           <a:p>
             <a:fld id="{79CA2621-9C9E-8341-B92B-7B23C30F706B}" type="datetimeFigureOut">
               <a:rPr lang="en-US" smtClean="0"/>
-              <a:t>4/21/23</a:t>
+              <a:t>6/30/23</a:t>
             </a:fld>
             <a:endParaRPr lang="en-US"/>
           </a:p>
@@ -864,7 +864,7 @@
           <a:p>
             <a:fld id="{79CA2621-9C9E-8341-B92B-7B23C30F706B}" type="datetimeFigureOut">
               <a:rPr lang="en-US" smtClean="0"/>
-              <a:t>4/21/23</a:t>
+              <a:t>6/30/23</a:t>
             </a:fld>
             <a:endParaRPr lang="en-US"/>
           </a:p>
@@ -1139,7 +1139,7 @@
           <a:p>
             <a:fld id="{79CA2621-9C9E-8341-B92B-7B23C30F706B}" type="datetimeFigureOut">
               <a:rPr lang="en-US" smtClean="0"/>
-              <a:t>4/21/23</a:t>
+              <a:t>6/30/23</a:t>
             </a:fld>
             <a:endParaRPr lang="en-US"/>
           </a:p>
@@ -1404,7 +1404,7 @@
           <a:p>
             <a:fld id="{79CA2621-9C9E-8341-B92B-7B23C30F706B}" type="datetimeFigureOut">
               <a:rPr lang="en-US" smtClean="0"/>
-              <a:t>4/21/23</a:t>
+              <a:t>6/30/23</a:t>
             </a:fld>
             <a:endParaRPr lang="en-US"/>
           </a:p>
@@ -1816,7 +1816,7 @@
           <a:p>
             <a:fld id="{79CA2621-9C9E-8341-B92B-7B23C30F706B}" type="datetimeFigureOut">
               <a:rPr lang="en-US" smtClean="0"/>
-              <a:t>4/21/23</a:t>
+              <a:t>6/30/23</a:t>
             </a:fld>
             <a:endParaRPr lang="en-US"/>
           </a:p>
@@ -1957,7 +1957,7 @@
           <a:p>
             <a:fld id="{79CA2621-9C9E-8341-B92B-7B23C30F706B}" type="datetimeFigureOut">
               <a:rPr lang="en-US" smtClean="0"/>
-              <a:t>4/21/23</a:t>
+              <a:t>6/30/23</a:t>
             </a:fld>
             <a:endParaRPr lang="en-US"/>
           </a:p>
@@ -2070,7 +2070,7 @@
           <a:p>
             <a:fld id="{79CA2621-9C9E-8341-B92B-7B23C30F706B}" type="datetimeFigureOut">
               <a:rPr lang="en-US" smtClean="0"/>
-              <a:t>4/21/23</a:t>
+              <a:t>6/30/23</a:t>
             </a:fld>
             <a:endParaRPr lang="en-US"/>
           </a:p>
@@ -2381,7 +2381,7 @@
           <a:p>
             <a:fld id="{79CA2621-9C9E-8341-B92B-7B23C30F706B}" type="datetimeFigureOut">
               <a:rPr lang="en-US" smtClean="0"/>
-              <a:t>4/21/23</a:t>
+              <a:t>6/30/23</a:t>
             </a:fld>
             <a:endParaRPr lang="en-US"/>
           </a:p>
@@ -2669,7 +2669,7 @@
           <a:p>
             <a:fld id="{79CA2621-9C9E-8341-B92B-7B23C30F706B}" type="datetimeFigureOut">
               <a:rPr lang="en-US" smtClean="0"/>
-              <a:t>4/21/23</a:t>
+              <a:t>6/30/23</a:t>
             </a:fld>
             <a:endParaRPr lang="en-US"/>
           </a:p>
@@ -2910,7 +2910,7 @@
           <a:p>
             <a:fld id="{79CA2621-9C9E-8341-B92B-7B23C30F706B}" type="datetimeFigureOut">
               <a:rPr lang="en-US" smtClean="0"/>
-              <a:t>4/21/23</a:t>
+              <a:t>6/30/23</a:t>
             </a:fld>
             <a:endParaRPr lang="en-US"/>
           </a:p>
@@ -3555,8 +3555,8 @@
         </p:blipFill>
         <p:spPr>
           <a:xfrm>
-            <a:off x="1524001" y="0"/>
-            <a:ext cx="9702799" cy="6791958"/>
+            <a:off x="1524002" y="0"/>
+            <a:ext cx="9702797" cy="6791958"/>
           </a:xfrm>
           <a:prstGeom prst="rect">
             <a:avLst/>

</xml_diff>

<commit_message>
figure updating and heatmap + new peeps added to email sender
</commit_message>
<xml_diff>
--- a/outputs/forpub/extras/study_area.pptx
+++ b/outputs/forpub/extras/study_area.pptx
@@ -260,7 +260,7 @@
           <a:p>
             <a:fld id="{79CA2621-9C9E-8341-B92B-7B23C30F706B}" type="datetimeFigureOut">
               <a:rPr lang="en-US" smtClean="0"/>
-              <a:t>6/30/23</a:t>
+              <a:t>7/31/23</a:t>
             </a:fld>
             <a:endParaRPr lang="en-US"/>
           </a:p>
@@ -458,7 +458,7 @@
           <a:p>
             <a:fld id="{79CA2621-9C9E-8341-B92B-7B23C30F706B}" type="datetimeFigureOut">
               <a:rPr lang="en-US" smtClean="0"/>
-              <a:t>6/30/23</a:t>
+              <a:t>7/31/23</a:t>
             </a:fld>
             <a:endParaRPr lang="en-US"/>
           </a:p>
@@ -666,7 +666,7 @@
           <a:p>
             <a:fld id="{79CA2621-9C9E-8341-B92B-7B23C30F706B}" type="datetimeFigureOut">
               <a:rPr lang="en-US" smtClean="0"/>
-              <a:t>6/30/23</a:t>
+              <a:t>7/31/23</a:t>
             </a:fld>
             <a:endParaRPr lang="en-US"/>
           </a:p>
@@ -864,7 +864,7 @@
           <a:p>
             <a:fld id="{79CA2621-9C9E-8341-B92B-7B23C30F706B}" type="datetimeFigureOut">
               <a:rPr lang="en-US" smtClean="0"/>
-              <a:t>6/30/23</a:t>
+              <a:t>7/31/23</a:t>
             </a:fld>
             <a:endParaRPr lang="en-US"/>
           </a:p>
@@ -1139,7 +1139,7 @@
           <a:p>
             <a:fld id="{79CA2621-9C9E-8341-B92B-7B23C30F706B}" type="datetimeFigureOut">
               <a:rPr lang="en-US" smtClean="0"/>
-              <a:t>6/30/23</a:t>
+              <a:t>7/31/23</a:t>
             </a:fld>
             <a:endParaRPr lang="en-US"/>
           </a:p>
@@ -1404,7 +1404,7 @@
           <a:p>
             <a:fld id="{79CA2621-9C9E-8341-B92B-7B23C30F706B}" type="datetimeFigureOut">
               <a:rPr lang="en-US" smtClean="0"/>
-              <a:t>6/30/23</a:t>
+              <a:t>7/31/23</a:t>
             </a:fld>
             <a:endParaRPr lang="en-US"/>
           </a:p>
@@ -1816,7 +1816,7 @@
           <a:p>
             <a:fld id="{79CA2621-9C9E-8341-B92B-7B23C30F706B}" type="datetimeFigureOut">
               <a:rPr lang="en-US" smtClean="0"/>
-              <a:t>6/30/23</a:t>
+              <a:t>7/31/23</a:t>
             </a:fld>
             <a:endParaRPr lang="en-US"/>
           </a:p>
@@ -1957,7 +1957,7 @@
           <a:p>
             <a:fld id="{79CA2621-9C9E-8341-B92B-7B23C30F706B}" type="datetimeFigureOut">
               <a:rPr lang="en-US" smtClean="0"/>
-              <a:t>6/30/23</a:t>
+              <a:t>7/31/23</a:t>
             </a:fld>
             <a:endParaRPr lang="en-US"/>
           </a:p>
@@ -2070,7 +2070,7 @@
           <a:p>
             <a:fld id="{79CA2621-9C9E-8341-B92B-7B23C30F706B}" type="datetimeFigureOut">
               <a:rPr lang="en-US" smtClean="0"/>
-              <a:t>6/30/23</a:t>
+              <a:t>7/31/23</a:t>
             </a:fld>
             <a:endParaRPr lang="en-US"/>
           </a:p>
@@ -2381,7 +2381,7 @@
           <a:p>
             <a:fld id="{79CA2621-9C9E-8341-B92B-7B23C30F706B}" type="datetimeFigureOut">
               <a:rPr lang="en-US" smtClean="0"/>
-              <a:t>6/30/23</a:t>
+              <a:t>7/31/23</a:t>
             </a:fld>
             <a:endParaRPr lang="en-US"/>
           </a:p>
@@ -2669,7 +2669,7 @@
           <a:p>
             <a:fld id="{79CA2621-9C9E-8341-B92B-7B23C30F706B}" type="datetimeFigureOut">
               <a:rPr lang="en-US" smtClean="0"/>
-              <a:t>6/30/23</a:t>
+              <a:t>7/31/23</a:t>
             </a:fld>
             <a:endParaRPr lang="en-US"/>
           </a:p>
@@ -2910,7 +2910,7 @@
           <a:p>
             <a:fld id="{79CA2621-9C9E-8341-B92B-7B23C30F706B}" type="datetimeFigureOut">
               <a:rPr lang="en-US" smtClean="0"/>
-              <a:t>6/30/23</a:t>
+              <a:t>7/31/23</a:t>
             </a:fld>
             <a:endParaRPr lang="en-US"/>
           </a:p>
@@ -3548,15 +3548,15 @@
           </p:cNvPicPr>
           <p:nvPr/>
         </p:nvPicPr>
-        <p:blipFill>
+        <p:blipFill rotWithShape="1">
           <a:blip r:embed="rId2"/>
-          <a:srcRect/>
+          <a:srcRect l="5091"/>
           <a:stretch/>
         </p:blipFill>
         <p:spPr>
           <a:xfrm>
-            <a:off x="1524002" y="0"/>
-            <a:ext cx="9702797" cy="6791958"/>
+            <a:off x="2017986" y="0"/>
+            <a:ext cx="9208813" cy="6791958"/>
           </a:xfrm>
           <a:prstGeom prst="rect">
             <a:avLst/>
@@ -3582,7 +3582,7 @@
         </p:nvSpPr>
         <p:spPr>
           <a:xfrm>
-            <a:off x="1524001" y="0"/>
+            <a:off x="8591770" y="3429000"/>
             <a:ext cx="2510971" cy="2481943"/>
           </a:xfrm>
           <a:prstGeom prst="rect">
@@ -3650,7 +3650,7 @@
         </p:blipFill>
         <p:spPr>
           <a:xfrm>
-            <a:off x="1524001" y="0"/>
+            <a:off x="8591770" y="3429000"/>
             <a:ext cx="2418443" cy="2474585"/>
           </a:xfrm>
           <a:prstGeom prst="rect">
@@ -3672,7 +3672,7 @@
         </p:nvSpPr>
         <p:spPr>
           <a:xfrm>
-            <a:off x="3178630" y="1048605"/>
+            <a:off x="10246399" y="4477605"/>
             <a:ext cx="304800" cy="228651"/>
           </a:xfrm>
           <a:prstGeom prst="frame">

</xml_diff>